<commit_message>
added ppt in Lecture-25
</commit_message>
<xml_diff>
--- a/Lecture-25/Lecture-25.pptx
+++ b/Lecture-25/Lecture-25.pptx
@@ -12,8 +12,8 @@
     <p:sldId id="256" r:id="rId3"/>
     <p:sldId id="257" r:id="rId4"/>
     <p:sldId id="262" r:id="rId5"/>
-    <p:sldId id="272" r:id="rId6"/>
-    <p:sldId id="265" r:id="rId7"/>
+    <p:sldId id="265" r:id="rId6"/>
+    <p:sldId id="272" r:id="rId7"/>
     <p:sldId id="264" r:id="rId8"/>
     <p:sldId id="263" r:id="rId9"/>
   </p:sldIdLst>
@@ -1032,12 +1032,7 @@
             <p:ph type="sldImg"/>
           </p:nvPr>
         </p:nvSpPr>
-        <p:spPr>
-          <a:xfrm>
-            <a:off x="381000" y="685800"/>
-            <a:ext cx="6096000" cy="3429000"/>
-          </a:xfrm>
-        </p:spPr>
+        <p:spPr/>
       </p:sp>
       <p:sp>
         <p:nvSpPr>
@@ -1080,7 +1075,7 @@
     </p:spTree>
     <p:extLst>
       <p:ext uri="{BB962C8B-B14F-4D97-AF65-F5344CB8AC3E}">
-        <p14:creationId xmlns:p14="http://schemas.microsoft.com/office/powerpoint/2010/main" val="2069213484"/>
+        <p14:creationId xmlns:p14="http://schemas.microsoft.com/office/powerpoint/2010/main" val="88527597"/>
       </p:ext>
     </p:extLst>
   </p:cSld>
@@ -1160,7 +1155,7 @@
     </p:spTree>
     <p:extLst>
       <p:ext uri="{BB962C8B-B14F-4D97-AF65-F5344CB8AC3E}">
-        <p14:creationId xmlns:p14="http://schemas.microsoft.com/office/powerpoint/2010/main" val="88527597"/>
+        <p14:creationId xmlns:p14="http://schemas.microsoft.com/office/powerpoint/2010/main" val="2069213484"/>
       </p:ext>
     </p:extLst>
   </p:cSld>
@@ -10358,7 +10353,7 @@
           <a:p>
             <a:fld id="{7E3D4EF1-0385-43D3-A179-699E3F2FE344}" type="datetime1">
               <a:rPr lang="en-IN" smtClean="0"/>
-              <a:t>09-11-2024</a:t>
+              <a:t>12-11-2024</a:t>
             </a:fld>
             <a:endParaRPr lang="en-IN" dirty="0"/>
           </a:p>
@@ -15266,7 +15261,7 @@
         <p:spPr>
           <a:xfrm>
             <a:off x="735150" y="1339275"/>
-            <a:ext cx="5555400" cy="1107965"/>
+            <a:ext cx="5555400" cy="492412"/>
           </a:xfrm>
           <a:prstGeom prst="rect">
             <a:avLst/>
@@ -15290,7 +15285,7 @@
               <a:buChar char="•"/>
             </a:pPr>
             <a:r>
-              <a:rPr lang="en-US" sz="2000" b="0" i="0" dirty="0">
+              <a:rPr lang="en-US" sz="2000" b="0" i="0">
                 <a:solidFill>
                   <a:schemeClr val="bg1"/>
                 </a:solidFill>
@@ -15300,35 +15295,6 @@
               </a:rPr>
               <a:t>React Routing</a:t>
             </a:r>
-          </a:p>
-          <a:p>
-            <a:pPr marL="342900" indent="-342900" algn="l" fontAlgn="base">
-              <a:buClr>
-                <a:schemeClr val="bg1"/>
-              </a:buClr>
-              <a:buFont typeface="Arial" panose="020B0604020202020204" pitchFamily="34" charset="0"/>
-              <a:buChar char="•"/>
-            </a:pPr>
-            <a:r>
-              <a:rPr lang="en-US" sz="2000" b="0" i="0" dirty="0">
-                <a:solidFill>
-                  <a:schemeClr val="bg1"/>
-                </a:solidFill>
-                <a:effectLst/>
-                <a:latin typeface="Calibri" panose="020F0502020204030204" pitchFamily="34" charset="0"/>
-                <a:cs typeface="Calibri" panose="020F0502020204030204" pitchFamily="34" charset="0"/>
-              </a:rPr>
-              <a:t>Events</a:t>
-            </a:r>
-          </a:p>
-          <a:p>
-            <a:pPr marL="342900" indent="-342900" algn="l" fontAlgn="base">
-              <a:buClr>
-                <a:schemeClr val="bg1"/>
-              </a:buClr>
-              <a:buFont typeface="Arial" panose="020B0604020202020204" pitchFamily="34" charset="0"/>
-              <a:buChar char="•"/>
-            </a:pPr>
             <a:endParaRPr lang="en-US" sz="2000" b="0" i="0" dirty="0">
               <a:solidFill>
                 <a:schemeClr val="bg1"/>
@@ -15748,6 +15714,375 @@
 </file>
 
 <file path=ppt/slides/slide4.xml><?xml version="1.0" encoding="utf-8"?>
+<p:sld xmlns:a="http://schemas.openxmlformats.org/drawingml/2006/main" xmlns:r="http://schemas.openxmlformats.org/officeDocument/2006/relationships" xmlns:p="http://schemas.openxmlformats.org/presentationml/2006/main">
+  <p:cSld>
+    <p:spTree>
+      <p:nvGrpSpPr>
+        <p:cNvPr id="1" name=""/>
+        <p:cNvGrpSpPr/>
+        <p:nvPr/>
+      </p:nvGrpSpPr>
+      <p:grpSpPr>
+        <a:xfrm>
+          <a:off x="0" y="0"/>
+          <a:ext cx="0" cy="0"/>
+          <a:chOff x="0" y="0"/>
+          <a:chExt cx="0" cy="0"/>
+        </a:xfrm>
+      </p:grpSpPr>
+      <p:sp>
+        <p:nvSpPr>
+          <p:cNvPr id="14" name="Rectangle 13">
+            <a:extLst>
+              <a:ext uri="{FF2B5EF4-FFF2-40B4-BE49-F238E27FC236}">
+                <a16:creationId xmlns:a16="http://schemas.microsoft.com/office/drawing/2014/main" id="{B16DB783-E6E4-4CD7-8444-DA7780AE5AB7}"/>
+              </a:ext>
+            </a:extLst>
+          </p:cNvPr>
+          <p:cNvSpPr/>
+          <p:nvPr/>
+        </p:nvSpPr>
+        <p:spPr>
+          <a:xfrm>
+            <a:off x="381001" y="463426"/>
+            <a:ext cx="8542193" cy="332509"/>
+          </a:xfrm>
+          <a:prstGeom prst="rect">
+            <a:avLst/>
+          </a:prstGeom>
+          <a:solidFill>
+            <a:schemeClr val="accent4">
+              <a:lumMod val="60000"/>
+              <a:lumOff val="40000"/>
+            </a:schemeClr>
+          </a:solidFill>
+          <a:ln>
+            <a:solidFill>
+              <a:schemeClr val="accent4">
+                <a:lumMod val="60000"/>
+                <a:lumOff val="40000"/>
+              </a:schemeClr>
+            </a:solidFill>
+          </a:ln>
+        </p:spPr>
+        <p:style>
+          <a:lnRef idx="2">
+            <a:schemeClr val="accent1">
+              <a:shade val="50000"/>
+            </a:schemeClr>
+          </a:lnRef>
+          <a:fillRef idx="1">
+            <a:schemeClr val="accent1"/>
+          </a:fillRef>
+          <a:effectRef idx="0">
+            <a:schemeClr val="accent1"/>
+          </a:effectRef>
+          <a:fontRef idx="minor">
+            <a:schemeClr val="lt1"/>
+          </a:fontRef>
+        </p:style>
+        <p:txBody>
+          <a:bodyPr rtlCol="0" anchor="ctr"/>
+          <a:lstStyle/>
+          <a:p>
+            <a:pPr algn="ctr"/>
+            <a:endParaRPr lang="en-IN" sz="1050" b="1">
+              <a:solidFill>
+                <a:schemeClr val="tx1"/>
+              </a:solidFill>
+            </a:endParaRPr>
+          </a:p>
+        </p:txBody>
+      </p:sp>
+      <p:sp>
+        <p:nvSpPr>
+          <p:cNvPr id="3" name="TextBox 2"/>
+          <p:cNvSpPr txBox="1"/>
+          <p:nvPr/>
+        </p:nvSpPr>
+        <p:spPr>
+          <a:xfrm>
+            <a:off x="381000" y="417426"/>
+            <a:ext cx="4693920" cy="415498"/>
+          </a:xfrm>
+          <a:prstGeom prst="rect">
+            <a:avLst/>
+          </a:prstGeom>
+          <a:noFill/>
+        </p:spPr>
+        <p:txBody>
+          <a:bodyPr wrap="square" rtlCol="0">
+            <a:spAutoFit/>
+          </a:bodyPr>
+          <a:lstStyle/>
+          <a:p>
+            <a:r>
+              <a:rPr lang="en-IN" sz="2100" b="1" dirty="0"/>
+              <a:t>React Router DOM</a:t>
+            </a:r>
+          </a:p>
+        </p:txBody>
+      </p:sp>
+      <p:sp>
+        <p:nvSpPr>
+          <p:cNvPr id="9" name="Rectangle 8">
+            <a:extLst>
+              <a:ext uri="{FF2B5EF4-FFF2-40B4-BE49-F238E27FC236}">
+                <a16:creationId xmlns:a16="http://schemas.microsoft.com/office/drawing/2014/main" id="{E3C711B4-9267-450B-911B-D23C4FF9AB79}"/>
+              </a:ext>
+            </a:extLst>
+          </p:cNvPr>
+          <p:cNvSpPr/>
+          <p:nvPr/>
+        </p:nvSpPr>
+        <p:spPr>
+          <a:xfrm>
+            <a:off x="381000" y="213012"/>
+            <a:ext cx="5713268" cy="114301"/>
+          </a:xfrm>
+          <a:prstGeom prst="rect">
+            <a:avLst/>
+          </a:prstGeom>
+        </p:spPr>
+        <p:style>
+          <a:lnRef idx="2">
+            <a:schemeClr val="dk1">
+              <a:shade val="50000"/>
+            </a:schemeClr>
+          </a:lnRef>
+          <a:fillRef idx="1">
+            <a:schemeClr val="dk1"/>
+          </a:fillRef>
+          <a:effectRef idx="0">
+            <a:schemeClr val="dk1"/>
+          </a:effectRef>
+          <a:fontRef idx="minor">
+            <a:schemeClr val="lt1"/>
+          </a:fontRef>
+        </p:style>
+        <p:txBody>
+          <a:bodyPr rtlCol="0" anchor="ctr"/>
+          <a:lstStyle/>
+          <a:p>
+            <a:pPr algn="ctr"/>
+            <a:endParaRPr lang="en-IN" sz="1050" b="1">
+              <a:solidFill>
+                <a:schemeClr val="tx1"/>
+              </a:solidFill>
+            </a:endParaRPr>
+          </a:p>
+        </p:txBody>
+      </p:sp>
+      <p:sp>
+        <p:nvSpPr>
+          <p:cNvPr id="12" name="Rectangle 11">
+            <a:extLst>
+              <a:ext uri="{FF2B5EF4-FFF2-40B4-BE49-F238E27FC236}">
+                <a16:creationId xmlns:a16="http://schemas.microsoft.com/office/drawing/2014/main" id="{E4AA21B7-659F-44B6-B547-5D9BB3366B48}"/>
+              </a:ext>
+            </a:extLst>
+          </p:cNvPr>
+          <p:cNvSpPr/>
+          <p:nvPr/>
+        </p:nvSpPr>
+        <p:spPr>
+          <a:xfrm>
+            <a:off x="4572001" y="213012"/>
+            <a:ext cx="4351193" cy="114302"/>
+          </a:xfrm>
+          <a:prstGeom prst="rect">
+            <a:avLst/>
+          </a:prstGeom>
+          <a:solidFill>
+            <a:schemeClr val="bg2">
+              <a:lumMod val="75000"/>
+            </a:schemeClr>
+          </a:solidFill>
+        </p:spPr>
+        <p:style>
+          <a:lnRef idx="2">
+            <a:schemeClr val="accent1">
+              <a:shade val="50000"/>
+            </a:schemeClr>
+          </a:lnRef>
+          <a:fillRef idx="1">
+            <a:schemeClr val="accent1"/>
+          </a:fillRef>
+          <a:effectRef idx="0">
+            <a:schemeClr val="accent1"/>
+          </a:effectRef>
+          <a:fontRef idx="minor">
+            <a:schemeClr val="lt1"/>
+          </a:fontRef>
+        </p:style>
+        <p:txBody>
+          <a:bodyPr rtlCol="0" anchor="ctr"/>
+          <a:lstStyle/>
+          <a:p>
+            <a:pPr algn="ctr"/>
+            <a:endParaRPr lang="en-IN" sz="1050" b="1">
+              <a:solidFill>
+                <a:schemeClr val="tx1"/>
+              </a:solidFill>
+            </a:endParaRPr>
+          </a:p>
+        </p:txBody>
+      </p:sp>
+      <p:sp>
+        <p:nvSpPr>
+          <p:cNvPr id="8" name="TextBox 7">
+            <a:extLst>
+              <a:ext uri="{FF2B5EF4-FFF2-40B4-BE49-F238E27FC236}">
+                <a16:creationId xmlns:a16="http://schemas.microsoft.com/office/drawing/2014/main" id="{DF52D4B8-876C-48A6-AB5A-9B6C49B20E4C}"/>
+              </a:ext>
+            </a:extLst>
+          </p:cNvPr>
+          <p:cNvSpPr txBox="1"/>
+          <p:nvPr/>
+        </p:nvSpPr>
+        <p:spPr>
+          <a:xfrm>
+            <a:off x="381000" y="809841"/>
+            <a:ext cx="8290560" cy="3780522"/>
+          </a:xfrm>
+          <a:prstGeom prst="rect">
+            <a:avLst/>
+          </a:prstGeom>
+          <a:noFill/>
+        </p:spPr>
+        <p:txBody>
+          <a:bodyPr wrap="square" rtlCol="0">
+            <a:spAutoFit/>
+          </a:bodyPr>
+          <a:lstStyle/>
+          <a:p>
+            <a:pPr marL="257175" indent="-257175">
+              <a:lnSpc>
+                <a:spcPct val="150000"/>
+              </a:lnSpc>
+              <a:buClr>
+                <a:schemeClr val="tx1"/>
+              </a:buClr>
+              <a:buFont typeface="Wingdings" panose="05000000000000000000" pitchFamily="2" charset="2"/>
+              <a:buChar char="§"/>
+            </a:pPr>
+            <a:r>
+              <a:rPr lang="en-US" sz="1800" dirty="0">
+                <a:solidFill>
+                  <a:srgbClr val="202124"/>
+                </a:solidFill>
+              </a:rPr>
+              <a:t>React Router DOM is an </a:t>
+            </a:r>
+            <a:r>
+              <a:rPr lang="en-US" sz="1800" dirty="0" err="1">
+                <a:solidFill>
+                  <a:srgbClr val="202124"/>
+                </a:solidFill>
+              </a:rPr>
+              <a:t>npm</a:t>
+            </a:r>
+            <a:r>
+              <a:rPr lang="en-US" sz="1800" dirty="0">
+                <a:solidFill>
+                  <a:srgbClr val="202124"/>
+                </a:solidFill>
+              </a:rPr>
+              <a:t> package that enables you to implement dynamic routing in a web app. It allows you to display pages and allow users to navigate them. It is a fully-featured client and server-side routing library for React</a:t>
+            </a:r>
+          </a:p>
+          <a:p>
+            <a:pPr marL="257175" indent="-257175">
+              <a:lnSpc>
+                <a:spcPct val="150000"/>
+              </a:lnSpc>
+              <a:buClr>
+                <a:schemeClr val="tx1"/>
+              </a:buClr>
+              <a:buFont typeface="Wingdings" panose="05000000000000000000" pitchFamily="2" charset="2"/>
+              <a:buChar char="§"/>
+            </a:pPr>
+            <a:endParaRPr lang="en-US" sz="1800" dirty="0">
+              <a:solidFill>
+                <a:srgbClr val="202124"/>
+              </a:solidFill>
+              <a:cs typeface="Calibri" panose="020F0502020204030204" pitchFamily="34" charset="0"/>
+            </a:endParaRPr>
+          </a:p>
+          <a:p>
+            <a:pPr marL="257175" indent="-257175">
+              <a:lnSpc>
+                <a:spcPct val="150000"/>
+              </a:lnSpc>
+              <a:buClr>
+                <a:schemeClr val="tx1"/>
+              </a:buClr>
+              <a:buFont typeface="Wingdings" panose="05000000000000000000" pitchFamily="2" charset="2"/>
+              <a:buChar char="§"/>
+            </a:pPr>
+            <a:r>
+              <a:rPr lang="en-US" sz="1800" dirty="0">
+                <a:cs typeface="Calibri" panose="020F0502020204030204" pitchFamily="34" charset="0"/>
+              </a:rPr>
+              <a:t>A &lt;</a:t>
+            </a:r>
+            <a:r>
+              <a:rPr lang="en-US" sz="1800" dirty="0" err="1">
+                <a:cs typeface="Calibri" panose="020F0502020204030204" pitchFamily="34" charset="0"/>
+              </a:rPr>
+              <a:t>BrowserRouter</a:t>
+            </a:r>
+            <a:r>
+              <a:rPr lang="en-US" sz="1800" dirty="0">
+                <a:cs typeface="Calibri" panose="020F0502020204030204" pitchFamily="34" charset="0"/>
+              </a:rPr>
+              <a:t>&gt; stores the current location in the browser's address bar using clean URLs and navigates using the browser's built-in history stack.</a:t>
+            </a:r>
+          </a:p>
+          <a:p>
+            <a:pPr marL="257175" indent="-257175">
+              <a:lnSpc>
+                <a:spcPct val="150000"/>
+              </a:lnSpc>
+              <a:buClr>
+                <a:schemeClr val="tx1"/>
+              </a:buClr>
+              <a:buFont typeface="Wingdings" panose="05000000000000000000" pitchFamily="2" charset="2"/>
+              <a:buChar char="§"/>
+            </a:pPr>
+            <a:endParaRPr lang="en-US" sz="1800" dirty="0">
+              <a:cs typeface="Calibri" panose="020F0502020204030204" pitchFamily="34" charset="0"/>
+            </a:endParaRPr>
+          </a:p>
+          <a:p>
+            <a:pPr marL="257175" indent="-257175">
+              <a:lnSpc>
+                <a:spcPct val="150000"/>
+              </a:lnSpc>
+              <a:buClr>
+                <a:schemeClr val="tx1"/>
+              </a:buClr>
+              <a:buFont typeface="Wingdings" panose="05000000000000000000" pitchFamily="2" charset="2"/>
+              <a:buChar char="§"/>
+            </a:pPr>
+            <a:endParaRPr lang="en-IN" sz="1800" dirty="0"/>
+          </a:p>
+        </p:txBody>
+      </p:sp>
+    </p:spTree>
+    <p:extLst>
+      <p:ext uri="{BB962C8B-B14F-4D97-AF65-F5344CB8AC3E}">
+        <p14:creationId xmlns:p14="http://schemas.microsoft.com/office/powerpoint/2010/main" val="1729761647"/>
+      </p:ext>
+    </p:extLst>
+  </p:cSld>
+  <p:clrMapOvr>
+    <a:masterClrMapping/>
+  </p:clrMapOvr>
+</p:sld>
+</file>
+
+<file path=ppt/slides/slide5.xml><?xml version="1.0" encoding="utf-8"?>
 <p:sld xmlns:a="http://schemas.openxmlformats.org/drawingml/2006/main" xmlns:r="http://schemas.openxmlformats.org/officeDocument/2006/relationships" xmlns:p="http://schemas.openxmlformats.org/presentationml/2006/main">
   <p:cSld>
     <p:spTree>
@@ -16096,375 +16431,6 @@
     <p:extLst>
       <p:ext uri="{BB962C8B-B14F-4D97-AF65-F5344CB8AC3E}">
         <p14:creationId xmlns:p14="http://schemas.microsoft.com/office/powerpoint/2010/main" val="2389133986"/>
-      </p:ext>
-    </p:extLst>
-  </p:cSld>
-  <p:clrMapOvr>
-    <a:masterClrMapping/>
-  </p:clrMapOvr>
-</p:sld>
-</file>
-
-<file path=ppt/slides/slide5.xml><?xml version="1.0" encoding="utf-8"?>
-<p:sld xmlns:a="http://schemas.openxmlformats.org/drawingml/2006/main" xmlns:r="http://schemas.openxmlformats.org/officeDocument/2006/relationships" xmlns:p="http://schemas.openxmlformats.org/presentationml/2006/main">
-  <p:cSld>
-    <p:spTree>
-      <p:nvGrpSpPr>
-        <p:cNvPr id="1" name=""/>
-        <p:cNvGrpSpPr/>
-        <p:nvPr/>
-      </p:nvGrpSpPr>
-      <p:grpSpPr>
-        <a:xfrm>
-          <a:off x="0" y="0"/>
-          <a:ext cx="0" cy="0"/>
-          <a:chOff x="0" y="0"/>
-          <a:chExt cx="0" cy="0"/>
-        </a:xfrm>
-      </p:grpSpPr>
-      <p:sp>
-        <p:nvSpPr>
-          <p:cNvPr id="14" name="Rectangle 13">
-            <a:extLst>
-              <a:ext uri="{FF2B5EF4-FFF2-40B4-BE49-F238E27FC236}">
-                <a16:creationId xmlns:a16="http://schemas.microsoft.com/office/drawing/2014/main" id="{B16DB783-E6E4-4CD7-8444-DA7780AE5AB7}"/>
-              </a:ext>
-            </a:extLst>
-          </p:cNvPr>
-          <p:cNvSpPr/>
-          <p:nvPr/>
-        </p:nvSpPr>
-        <p:spPr>
-          <a:xfrm>
-            <a:off x="381001" y="463426"/>
-            <a:ext cx="8542193" cy="332509"/>
-          </a:xfrm>
-          <a:prstGeom prst="rect">
-            <a:avLst/>
-          </a:prstGeom>
-          <a:solidFill>
-            <a:schemeClr val="accent4">
-              <a:lumMod val="60000"/>
-              <a:lumOff val="40000"/>
-            </a:schemeClr>
-          </a:solidFill>
-          <a:ln>
-            <a:solidFill>
-              <a:schemeClr val="accent4">
-                <a:lumMod val="60000"/>
-                <a:lumOff val="40000"/>
-              </a:schemeClr>
-            </a:solidFill>
-          </a:ln>
-        </p:spPr>
-        <p:style>
-          <a:lnRef idx="2">
-            <a:schemeClr val="accent1">
-              <a:shade val="50000"/>
-            </a:schemeClr>
-          </a:lnRef>
-          <a:fillRef idx="1">
-            <a:schemeClr val="accent1"/>
-          </a:fillRef>
-          <a:effectRef idx="0">
-            <a:schemeClr val="accent1"/>
-          </a:effectRef>
-          <a:fontRef idx="minor">
-            <a:schemeClr val="lt1"/>
-          </a:fontRef>
-        </p:style>
-        <p:txBody>
-          <a:bodyPr rtlCol="0" anchor="ctr"/>
-          <a:lstStyle/>
-          <a:p>
-            <a:pPr algn="ctr"/>
-            <a:endParaRPr lang="en-IN" sz="1050" b="1">
-              <a:solidFill>
-                <a:schemeClr val="tx1"/>
-              </a:solidFill>
-            </a:endParaRPr>
-          </a:p>
-        </p:txBody>
-      </p:sp>
-      <p:sp>
-        <p:nvSpPr>
-          <p:cNvPr id="3" name="TextBox 2"/>
-          <p:cNvSpPr txBox="1"/>
-          <p:nvPr/>
-        </p:nvSpPr>
-        <p:spPr>
-          <a:xfrm>
-            <a:off x="381000" y="417426"/>
-            <a:ext cx="4693920" cy="415498"/>
-          </a:xfrm>
-          <a:prstGeom prst="rect">
-            <a:avLst/>
-          </a:prstGeom>
-          <a:noFill/>
-        </p:spPr>
-        <p:txBody>
-          <a:bodyPr wrap="square" rtlCol="0">
-            <a:spAutoFit/>
-          </a:bodyPr>
-          <a:lstStyle/>
-          <a:p>
-            <a:r>
-              <a:rPr lang="en-IN" sz="2100" b="1" dirty="0"/>
-              <a:t>React Router DOM</a:t>
-            </a:r>
-          </a:p>
-        </p:txBody>
-      </p:sp>
-      <p:sp>
-        <p:nvSpPr>
-          <p:cNvPr id="9" name="Rectangle 8">
-            <a:extLst>
-              <a:ext uri="{FF2B5EF4-FFF2-40B4-BE49-F238E27FC236}">
-                <a16:creationId xmlns:a16="http://schemas.microsoft.com/office/drawing/2014/main" id="{E3C711B4-9267-450B-911B-D23C4FF9AB79}"/>
-              </a:ext>
-            </a:extLst>
-          </p:cNvPr>
-          <p:cNvSpPr/>
-          <p:nvPr/>
-        </p:nvSpPr>
-        <p:spPr>
-          <a:xfrm>
-            <a:off x="381000" y="213012"/>
-            <a:ext cx="5713268" cy="114301"/>
-          </a:xfrm>
-          <a:prstGeom prst="rect">
-            <a:avLst/>
-          </a:prstGeom>
-        </p:spPr>
-        <p:style>
-          <a:lnRef idx="2">
-            <a:schemeClr val="dk1">
-              <a:shade val="50000"/>
-            </a:schemeClr>
-          </a:lnRef>
-          <a:fillRef idx="1">
-            <a:schemeClr val="dk1"/>
-          </a:fillRef>
-          <a:effectRef idx="0">
-            <a:schemeClr val="dk1"/>
-          </a:effectRef>
-          <a:fontRef idx="minor">
-            <a:schemeClr val="lt1"/>
-          </a:fontRef>
-        </p:style>
-        <p:txBody>
-          <a:bodyPr rtlCol="0" anchor="ctr"/>
-          <a:lstStyle/>
-          <a:p>
-            <a:pPr algn="ctr"/>
-            <a:endParaRPr lang="en-IN" sz="1050" b="1">
-              <a:solidFill>
-                <a:schemeClr val="tx1"/>
-              </a:solidFill>
-            </a:endParaRPr>
-          </a:p>
-        </p:txBody>
-      </p:sp>
-      <p:sp>
-        <p:nvSpPr>
-          <p:cNvPr id="12" name="Rectangle 11">
-            <a:extLst>
-              <a:ext uri="{FF2B5EF4-FFF2-40B4-BE49-F238E27FC236}">
-                <a16:creationId xmlns:a16="http://schemas.microsoft.com/office/drawing/2014/main" id="{E4AA21B7-659F-44B6-B547-5D9BB3366B48}"/>
-              </a:ext>
-            </a:extLst>
-          </p:cNvPr>
-          <p:cNvSpPr/>
-          <p:nvPr/>
-        </p:nvSpPr>
-        <p:spPr>
-          <a:xfrm>
-            <a:off x="4572001" y="213012"/>
-            <a:ext cx="4351193" cy="114302"/>
-          </a:xfrm>
-          <a:prstGeom prst="rect">
-            <a:avLst/>
-          </a:prstGeom>
-          <a:solidFill>
-            <a:schemeClr val="bg2">
-              <a:lumMod val="75000"/>
-            </a:schemeClr>
-          </a:solidFill>
-        </p:spPr>
-        <p:style>
-          <a:lnRef idx="2">
-            <a:schemeClr val="accent1">
-              <a:shade val="50000"/>
-            </a:schemeClr>
-          </a:lnRef>
-          <a:fillRef idx="1">
-            <a:schemeClr val="accent1"/>
-          </a:fillRef>
-          <a:effectRef idx="0">
-            <a:schemeClr val="accent1"/>
-          </a:effectRef>
-          <a:fontRef idx="minor">
-            <a:schemeClr val="lt1"/>
-          </a:fontRef>
-        </p:style>
-        <p:txBody>
-          <a:bodyPr rtlCol="0" anchor="ctr"/>
-          <a:lstStyle/>
-          <a:p>
-            <a:pPr algn="ctr"/>
-            <a:endParaRPr lang="en-IN" sz="1050" b="1">
-              <a:solidFill>
-                <a:schemeClr val="tx1"/>
-              </a:solidFill>
-            </a:endParaRPr>
-          </a:p>
-        </p:txBody>
-      </p:sp>
-      <p:sp>
-        <p:nvSpPr>
-          <p:cNvPr id="8" name="TextBox 7">
-            <a:extLst>
-              <a:ext uri="{FF2B5EF4-FFF2-40B4-BE49-F238E27FC236}">
-                <a16:creationId xmlns:a16="http://schemas.microsoft.com/office/drawing/2014/main" id="{DF52D4B8-876C-48A6-AB5A-9B6C49B20E4C}"/>
-              </a:ext>
-            </a:extLst>
-          </p:cNvPr>
-          <p:cNvSpPr txBox="1"/>
-          <p:nvPr/>
-        </p:nvSpPr>
-        <p:spPr>
-          <a:xfrm>
-            <a:off x="381000" y="809841"/>
-            <a:ext cx="8290560" cy="3780522"/>
-          </a:xfrm>
-          <a:prstGeom prst="rect">
-            <a:avLst/>
-          </a:prstGeom>
-          <a:noFill/>
-        </p:spPr>
-        <p:txBody>
-          <a:bodyPr wrap="square" rtlCol="0">
-            <a:spAutoFit/>
-          </a:bodyPr>
-          <a:lstStyle/>
-          <a:p>
-            <a:pPr marL="257175" indent="-257175">
-              <a:lnSpc>
-                <a:spcPct val="150000"/>
-              </a:lnSpc>
-              <a:buClr>
-                <a:schemeClr val="tx1"/>
-              </a:buClr>
-              <a:buFont typeface="Wingdings" panose="05000000000000000000" pitchFamily="2" charset="2"/>
-              <a:buChar char="§"/>
-            </a:pPr>
-            <a:r>
-              <a:rPr lang="en-US" sz="1800" dirty="0">
-                <a:solidFill>
-                  <a:srgbClr val="202124"/>
-                </a:solidFill>
-              </a:rPr>
-              <a:t>React Router DOM is an </a:t>
-            </a:r>
-            <a:r>
-              <a:rPr lang="en-US" sz="1800" dirty="0" err="1">
-                <a:solidFill>
-                  <a:srgbClr val="202124"/>
-                </a:solidFill>
-              </a:rPr>
-              <a:t>npm</a:t>
-            </a:r>
-            <a:r>
-              <a:rPr lang="en-US" sz="1800" dirty="0">
-                <a:solidFill>
-                  <a:srgbClr val="202124"/>
-                </a:solidFill>
-              </a:rPr>
-              <a:t> package that enables you to implement dynamic routing in a web app. It allows you to display pages and allow users to navigate them. It is a fully-featured client and server-side routing library for React</a:t>
-            </a:r>
-          </a:p>
-          <a:p>
-            <a:pPr marL="257175" indent="-257175">
-              <a:lnSpc>
-                <a:spcPct val="150000"/>
-              </a:lnSpc>
-              <a:buClr>
-                <a:schemeClr val="tx1"/>
-              </a:buClr>
-              <a:buFont typeface="Wingdings" panose="05000000000000000000" pitchFamily="2" charset="2"/>
-              <a:buChar char="§"/>
-            </a:pPr>
-            <a:endParaRPr lang="en-US" sz="1800" dirty="0">
-              <a:solidFill>
-                <a:srgbClr val="202124"/>
-              </a:solidFill>
-              <a:cs typeface="Calibri" panose="020F0502020204030204" pitchFamily="34" charset="0"/>
-            </a:endParaRPr>
-          </a:p>
-          <a:p>
-            <a:pPr marL="257175" indent="-257175">
-              <a:lnSpc>
-                <a:spcPct val="150000"/>
-              </a:lnSpc>
-              <a:buClr>
-                <a:schemeClr val="tx1"/>
-              </a:buClr>
-              <a:buFont typeface="Wingdings" panose="05000000000000000000" pitchFamily="2" charset="2"/>
-              <a:buChar char="§"/>
-            </a:pPr>
-            <a:r>
-              <a:rPr lang="en-US" sz="1800" dirty="0">
-                <a:cs typeface="Calibri" panose="020F0502020204030204" pitchFamily="34" charset="0"/>
-              </a:rPr>
-              <a:t>A &lt;</a:t>
-            </a:r>
-            <a:r>
-              <a:rPr lang="en-US" sz="1800" dirty="0" err="1">
-                <a:cs typeface="Calibri" panose="020F0502020204030204" pitchFamily="34" charset="0"/>
-              </a:rPr>
-              <a:t>BrowserRouter</a:t>
-            </a:r>
-            <a:r>
-              <a:rPr lang="en-US" sz="1800" dirty="0">
-                <a:cs typeface="Calibri" panose="020F0502020204030204" pitchFamily="34" charset="0"/>
-              </a:rPr>
-              <a:t>&gt; stores the current location in the browser's address bar using clean URLs and navigates using the browser's built-in history stack.</a:t>
-            </a:r>
-          </a:p>
-          <a:p>
-            <a:pPr marL="257175" indent="-257175">
-              <a:lnSpc>
-                <a:spcPct val="150000"/>
-              </a:lnSpc>
-              <a:buClr>
-                <a:schemeClr val="tx1"/>
-              </a:buClr>
-              <a:buFont typeface="Wingdings" panose="05000000000000000000" pitchFamily="2" charset="2"/>
-              <a:buChar char="§"/>
-            </a:pPr>
-            <a:endParaRPr lang="en-US" sz="1800" dirty="0">
-              <a:cs typeface="Calibri" panose="020F0502020204030204" pitchFamily="34" charset="0"/>
-            </a:endParaRPr>
-          </a:p>
-          <a:p>
-            <a:pPr marL="257175" indent="-257175">
-              <a:lnSpc>
-                <a:spcPct val="150000"/>
-              </a:lnSpc>
-              <a:buClr>
-                <a:schemeClr val="tx1"/>
-              </a:buClr>
-              <a:buFont typeface="Wingdings" panose="05000000000000000000" pitchFamily="2" charset="2"/>
-              <a:buChar char="§"/>
-            </a:pPr>
-            <a:endParaRPr lang="en-IN" sz="1800" dirty="0"/>
-          </a:p>
-        </p:txBody>
-      </p:sp>
-    </p:spTree>
-    <p:extLst>
-      <p:ext uri="{BB962C8B-B14F-4D97-AF65-F5344CB8AC3E}">
-        <p14:creationId xmlns:p14="http://schemas.microsoft.com/office/powerpoint/2010/main" val="1729761647"/>
       </p:ext>
     </p:extLst>
   </p:cSld>

</xml_diff>